<commit_message>
Upgraded to VS2010 and added the ASP.NET Connections slides.
</commit_message>
<xml_diff>
--- a/slides/open_source.pptx
+++ b/slides/open_source.pptx
@@ -273,7 +273,7 @@
             <a:fld id="{E8232883-DBF1-4B11-A3EF-8BE56DDF49A3}" type="datetimeFigureOut">
               <a:rPr lang="en-US" smtClean="0"/>
               <a:pPr/>
-              <a:t>6/17/2010</a:t>
+              <a:t>9/19/2010</a:t>
             </a:fld>
             <a:endParaRPr lang="en-US"/>
           </a:p>
@@ -350,6 +350,11 @@
         </p:txBody>
       </p:sp>
     </p:spTree>
+    <p:extLst>
+      <p:ext uri="{BB962C8B-B14F-4D97-AF65-F5344CB8AC3E}">
+        <p14:creationId xmlns:p14="http://schemas.microsoft.com/office/powerpoint/2010/main" val="1420427029"/>
+      </p:ext>
+    </p:extLst>
   </p:cSld>
   <p:clrMap bg1="lt1" tx1="dk1" bg2="lt2" tx2="dk2" accent1="accent1" accent2="accent2" accent3="accent3" accent4="accent4" accent5="accent5" accent6="accent6" hlink="hlink" folHlink="folHlink"/>
 </p:handoutMaster>
@@ -462,7 +467,7 @@
               <a:pPr>
                 <a:defRPr/>
               </a:pPr>
-              <a:t>6/17/2010</a:t>
+              <a:t>9/19/2010</a:t>
             </a:fld>
             <a:endParaRPr lang="en-US"/>
           </a:p>
@@ -655,6 +660,11 @@
         </p:txBody>
       </p:sp>
     </p:spTree>
+    <p:extLst>
+      <p:ext uri="{BB962C8B-B14F-4D97-AF65-F5344CB8AC3E}">
+        <p14:creationId xmlns:p14="http://schemas.microsoft.com/office/powerpoint/2010/main" val="206296066"/>
+      </p:ext>
+    </p:extLst>
   </p:cSld>
   <p:clrMap bg1="lt1" tx1="dk1" bg2="lt2" tx2="dk2" accent1="accent1" accent2="accent2" accent3="accent3" accent4="accent4" accent5="accent5" accent6="accent6" hlink="hlink" folHlink="folHlink"/>
   <p:notesStyle>
@@ -7039,7 +7049,7 @@
               <a:pPr>
                 <a:defRPr/>
               </a:pPr>
-              <a:t>6/17/2010</a:t>
+              <a:t>9/19/2010</a:t>
             </a:fld>
             <a:endParaRPr lang="en-US"/>
           </a:p>
@@ -7370,7 +7380,7 @@
               <a:pPr>
                 <a:defRPr/>
               </a:pPr>
-              <a:t>6/17/2010</a:t>
+              <a:t>9/19/2010</a:t>
             </a:fld>
             <a:endParaRPr lang="en-US"/>
           </a:p>
@@ -7560,7 +7570,7 @@
               <a:pPr>
                 <a:defRPr/>
               </a:pPr>
-              <a:t>6/17/2010</a:t>
+              <a:t>9/19/2010</a:t>
             </a:fld>
             <a:endParaRPr lang="en-US"/>
           </a:p>
@@ -7887,7 +7897,7 @@
               <a:pPr>
                 <a:defRPr/>
               </a:pPr>
-              <a:t>6/17/2010</a:t>
+              <a:t>9/19/2010</a:t>
             </a:fld>
             <a:endParaRPr lang="en-US"/>
           </a:p>
@@ -8200,7 +8210,7 @@
               <a:pPr>
                 <a:defRPr/>
               </a:pPr>
-              <a:t>6/17/2010</a:t>
+              <a:t>9/19/2010</a:t>
             </a:fld>
             <a:endParaRPr lang="en-US"/>
           </a:p>
@@ -8508,7 +8518,7 @@
               <a:pPr>
                 <a:defRPr/>
               </a:pPr>
-              <a:t>6/17/2010</a:t>
+              <a:t>9/19/2010</a:t>
             </a:fld>
             <a:endParaRPr lang="en-US"/>
           </a:p>
@@ -8951,7 +8961,7 @@
               <a:pPr>
                 <a:defRPr/>
               </a:pPr>
-              <a:t>6/17/2010</a:t>
+              <a:t>9/19/2010</a:t>
             </a:fld>
             <a:endParaRPr lang="en-US"/>
           </a:p>
@@ -9084,7 +9094,7 @@
               <a:pPr>
                 <a:defRPr/>
               </a:pPr>
-              <a:t>6/17/2010</a:t>
+              <a:t>9/19/2010</a:t>
             </a:fld>
             <a:endParaRPr lang="en-US"/>
           </a:p>
@@ -9189,7 +9199,7 @@
               <a:pPr>
                 <a:defRPr/>
               </a:pPr>
-              <a:t>6/17/2010</a:t>
+              <a:t>9/19/2010</a:t>
             </a:fld>
             <a:endParaRPr lang="en-US"/>
           </a:p>
@@ -9454,7 +9464,7 @@
               <a:pPr>
                 <a:defRPr/>
               </a:pPr>
-              <a:t>6/17/2010</a:t>
+              <a:t>9/19/2010</a:t>
             </a:fld>
             <a:endParaRPr lang="en-US"/>
           </a:p>
@@ -9985,7 +9995,7 @@
               <a:pPr>
                 <a:defRPr/>
               </a:pPr>
-              <a:t>6/17/2010</a:t>
+              <a:t>9/19/2010</a:t>
             </a:fld>
             <a:endParaRPr lang="en-US"/>
           </a:p>
@@ -10230,7 +10240,7 @@
               <a:pPr>
                 <a:defRPr/>
               </a:pPr>
-              <a:t>6/17/2010</a:t>
+              <a:t>9/19/2010</a:t>
             </a:fld>
             <a:endParaRPr lang="en-US"/>
           </a:p>
@@ -10857,19 +10867,11 @@
             <a:pPr algn="r" eaLnBrk="1" hangingPunct="1"/>
             <a:r>
               <a:rPr lang="en-US" sz="1600" b="1" dirty="0" err="1" smtClean="0"/>
-              <a:t>l</a:t>
-            </a:r>
-            <a:r>
-              <a:rPr lang="en-US" sz="1600" b="1" dirty="0" err="1" smtClean="0"/>
-              <a:t>ozanotek</a:t>
+              <a:t>lozanotek</a:t>
             </a:r>
             <a:r>
               <a:rPr lang="en-US" sz="1600" b="1" dirty="0" smtClean="0"/>
-              <a:t>, </a:t>
-            </a:r>
-            <a:r>
-              <a:rPr lang="en-US" sz="1600" b="1" dirty="0" smtClean="0"/>
-              <a:t>principal</a:t>
+              <a:t>, principal</a:t>
             </a:r>
             <a:endParaRPr lang="en-US" sz="1600" b="1" dirty="0"/>
           </a:p>
@@ -12391,13 +12393,8 @@
             </a:r>
             <a:r>
               <a:rPr lang="en-US" sz="3200" dirty="0" smtClean="0"/>
-              <a:t> </a:t>
-            </a:r>
-            <a:r>
-              <a:rPr lang="en-US" sz="3200" dirty="0" smtClean="0"/>
-              <a:t>Overview</a:t>
-            </a:r>
-            <a:endParaRPr lang="en-US" sz="3200" dirty="0" smtClean="0"/>
+              <a:t> Overview</a:t>
+            </a:r>
           </a:p>
         </p:txBody>
       </p:sp>
@@ -12994,7 +12991,11 @@
             </a:pPr>
             <a:r>
               <a:rPr lang="en-US" sz="2400" dirty="0" smtClean="0"/>
-              <a:t>Yet Another Blog Engine (YABE)</a:t>
+              <a:t>Data </a:t>
+            </a:r>
+            <a:r>
+              <a:rPr lang="en-US" sz="2400" dirty="0" smtClean="0"/>
+              <a:t>Tooling</a:t>
             </a:r>
           </a:p>
           <a:p>
@@ -13005,7 +13006,7 @@
             </a:pPr>
             <a:r>
               <a:rPr lang="en-US" sz="2400" dirty="0" smtClean="0"/>
-              <a:t>Data Tooling</a:t>
+              <a:t>Architectural Tooling</a:t>
             </a:r>
           </a:p>
           <a:p>
@@ -13016,7 +13017,7 @@
             </a:pPr>
             <a:r>
               <a:rPr lang="en-US" sz="2400" dirty="0" smtClean="0"/>
-              <a:t>Architectural Tooling</a:t>
+              <a:t>Instrumentation Tooling</a:t>
             </a:r>
           </a:p>
           <a:p>
@@ -13027,7 +13028,7 @@
             </a:pPr>
             <a:r>
               <a:rPr lang="en-US" sz="2400" dirty="0" smtClean="0"/>
-              <a:t>Instrumentation Tooling</a:t>
+              <a:t>Testing Tooling</a:t>
             </a:r>
           </a:p>
           <a:p>
@@ -13037,40 +13038,7 @@
               </a:lnSpc>
             </a:pPr>
             <a:r>
-              <a:rPr lang="en-US" sz="2400" dirty="0" smtClean="0"/>
-              <a:t>Testing Tooling</a:t>
-            </a:r>
-          </a:p>
-          <a:p>
-            <a:pPr>
-              <a:lnSpc>
-                <a:spcPct val="90000"/>
-              </a:lnSpc>
-            </a:pPr>
-            <a:r>
-              <a:rPr lang="en-US" sz="2400" dirty="0" smtClean="0"/>
-              <a:t>Build Tooling</a:t>
-            </a:r>
-          </a:p>
-          <a:p>
-            <a:pPr>
-              <a:lnSpc>
-                <a:spcPct val="90000"/>
-              </a:lnSpc>
-            </a:pPr>
-            <a:r>
-              <a:rPr lang="en-US" sz="2400" dirty="0" smtClean="0"/>
-              <a:t>Recap</a:t>
-            </a:r>
-          </a:p>
-          <a:p>
-            <a:pPr>
-              <a:lnSpc>
-                <a:spcPct val="90000"/>
-              </a:lnSpc>
-            </a:pPr>
-            <a:r>
-              <a:rPr lang="en-US" sz="2400" dirty="0" smtClean="0"/>
+              <a:rPr lang="en-US" sz="2400" smtClean="0"/>
               <a:t>Questions</a:t>
             </a:r>
             <a:endParaRPr lang="en-US" sz="2400" dirty="0" smtClean="0">
@@ -13755,11 +13723,7 @@
             </a:r>
             <a:r>
               <a:rPr lang="en-GB" sz="2400" dirty="0" smtClean="0"/>
-              <a:t> </a:t>
-            </a:r>
-            <a:r>
-              <a:rPr lang="en-GB" sz="2400" dirty="0" smtClean="0"/>
-              <a:t>test</a:t>
+              <a:t> test</a:t>
             </a:r>
           </a:p>
           <a:p>
@@ -13962,13 +13926,8 @@
             </a:r>
             <a:r>
               <a:rPr lang="en-GB" sz="2400" dirty="0" smtClean="0"/>
-              <a:t> is the base implementation of the </a:t>
-            </a:r>
-            <a:r>
-              <a:rPr lang="en-GB" sz="2400" dirty="0" smtClean="0"/>
-              <a:t>container</a:t>
-            </a:r>
-            <a:endParaRPr lang="en-GB" sz="2400" dirty="0" smtClean="0"/>
+              <a:t> is the base implementation of the container</a:t>
+            </a:r>
           </a:p>
         </p:txBody>
       </p:sp>
@@ -14097,11 +14056,7 @@
             </a:pPr>
             <a:r>
               <a:rPr lang="en-GB" sz="2400" dirty="0" smtClean="0"/>
-              <a:t>Windsor </a:t>
-            </a:r>
-            <a:r>
-              <a:rPr lang="en-GB" sz="2400" dirty="0" smtClean="0"/>
-              <a:t>is the facade of the core with a simpler interface</a:t>
+              <a:t>Windsor is the facade of the core with a simpler interface</a:t>
             </a:r>
           </a:p>
           <a:p>
@@ -14246,7 +14201,6 @@
               <a:rPr lang="en-US" sz="3200" dirty="0" smtClean="0"/>
               <a:t>Castle Windsor Overview</a:t>
             </a:r>
-            <a:endParaRPr lang="en-US" sz="3200" dirty="0" smtClean="0"/>
           </a:p>
         </p:txBody>
       </p:sp>
@@ -14650,11 +14604,7 @@
             <a:pPr lvl="1"/>
             <a:r>
               <a:rPr lang="en-US" sz="2400" dirty="0" smtClean="0"/>
-              <a:t>Declarative </a:t>
-            </a:r>
-            <a:r>
-              <a:rPr lang="en-US" sz="2400" dirty="0" smtClean="0"/>
-              <a:t>formatting of trace output / Filtering</a:t>
+              <a:t>Declarative formatting of trace output / Filtering</a:t>
             </a:r>
           </a:p>
           <a:p>
@@ -14786,11 +14736,7 @@
             <a:pPr lvl="1"/>
             <a:r>
               <a:rPr lang="en-US" sz="2400" dirty="0" smtClean="0"/>
-              <a:t>Declarative </a:t>
-            </a:r>
-            <a:r>
-              <a:rPr lang="en-US" sz="2400" dirty="0" smtClean="0"/>
-              <a:t>formatting of trace output / Filtering</a:t>
+              <a:t>Declarative formatting of trace output / Filtering</a:t>
             </a:r>
           </a:p>
           <a:p>
@@ -15072,13 +15018,8 @@
             </a:pPr>
             <a:r>
               <a:rPr lang="en-US" sz="3200" dirty="0" smtClean="0"/>
-              <a:t>log4net </a:t>
-            </a:r>
-            <a:r>
-              <a:rPr lang="en-US" sz="3200" dirty="0" smtClean="0"/>
-              <a:t>Overview</a:t>
-            </a:r>
-            <a:endParaRPr lang="en-US" sz="3200" dirty="0" smtClean="0"/>
+              <a:t>log4net Overview</a:t>
+            </a:r>
           </a:p>
         </p:txBody>
       </p:sp>
@@ -15222,13 +15163,8 @@
             </a:pPr>
             <a:r>
               <a:rPr lang="en-US" sz="2400" dirty="0" smtClean="0"/>
-              <a:t>Is NOT Test Driven Development (TDD</a:t>
-            </a:r>
-            <a:r>
-              <a:rPr lang="en-US" sz="2400" dirty="0" smtClean="0"/>
-              <a:t>)</a:t>
-            </a:r>
-            <a:endParaRPr lang="en-US" sz="2400" dirty="0" smtClean="0"/>
+              <a:t>Is NOT Test Driven Development (TDD)</a:t>
+            </a:r>
           </a:p>
           <a:p>
             <a:pPr lvl="2">
@@ -15393,15 +15329,7 @@
             <a:pPr lvl="1"/>
             <a:r>
               <a:rPr lang="nb-NO" sz="2400" dirty="0" smtClean="0"/>
-              <a:t>F</a:t>
-            </a:r>
-            <a:r>
-              <a:rPr lang="nb-NO" sz="2400" dirty="0" smtClean="0"/>
-              <a:t>ind </a:t>
-            </a:r>
-            <a:r>
-              <a:rPr lang="nb-NO" sz="2400" dirty="0" smtClean="0"/>
-              <a:t>bugs</a:t>
+              <a:t>Find bugs</a:t>
             </a:r>
           </a:p>
           <a:p>
@@ -15422,13 +15350,8 @@
             <a:pPr lvl="1"/>
             <a:r>
               <a:rPr lang="en-US" sz="2400" dirty="0" smtClean="0"/>
-              <a:t>Develop new pieces for the </a:t>
-            </a:r>
-            <a:r>
-              <a:rPr lang="en-US" sz="2400" dirty="0" smtClean="0"/>
-              <a:t>application</a:t>
-            </a:r>
-            <a:endParaRPr lang="en-US" sz="2400" dirty="0" smtClean="0"/>
+              <a:t>Develop new pieces for the application</a:t>
+            </a:r>
           </a:p>
           <a:p>
             <a:pPr lvl="2">
@@ -15574,11 +15497,7 @@
             <a:pPr lvl="1"/>
             <a:r>
               <a:rPr lang="nb-NO" sz="2400" dirty="0" smtClean="0"/>
-              <a:t>Built entirely in C# to take full advantage of CLR </a:t>
-            </a:r>
-            <a:r>
-              <a:rPr lang="nb-NO" sz="2400" dirty="0" smtClean="0"/>
-              <a:t>features</a:t>
+              <a:t>Built entirely in C# to take full advantage of CLR features</a:t>
             </a:r>
             <a:endParaRPr lang="en-US" sz="2400" dirty="0" smtClean="0"/>
           </a:p>
@@ -15730,11 +15649,7 @@
             <a:pPr lvl="1"/>
             <a:r>
               <a:rPr lang="nb-NO" sz="2400" dirty="0" smtClean="0"/>
-              <a:t>Understand </a:t>
-            </a:r>
-            <a:r>
-              <a:rPr lang="nb-NO" sz="2400" dirty="0" smtClean="0"/>
-              <a:t>and document the application</a:t>
+              <a:t>Understand and document the application</a:t>
             </a:r>
           </a:p>
           <a:p>
@@ -15909,7 +15824,6 @@
               <a:rPr lang="en-US" sz="3200" dirty="0" smtClean="0"/>
               <a:t>) Overview</a:t>
             </a:r>
-            <a:endParaRPr lang="en-US" sz="3200" dirty="0" smtClean="0"/>
           </a:p>
         </p:txBody>
       </p:sp>
@@ -16403,13 +16317,8 @@
             </a:pPr>
             <a:r>
               <a:rPr lang="en-US" sz="2400" dirty="0" smtClean="0"/>
-              <a:t>Build </a:t>
-            </a:r>
-            <a:r>
-              <a:rPr lang="en-US" sz="2400" dirty="0" smtClean="0"/>
-              <a:t>Management</a:t>
-            </a:r>
-            <a:endParaRPr lang="en-US" sz="2400" dirty="0" smtClean="0"/>
+              <a:t>Build Management</a:t>
+            </a:r>
           </a:p>
         </p:txBody>
       </p:sp>
@@ -16542,11 +16451,7 @@
             </a:pPr>
             <a:r>
               <a:rPr lang="en-US" sz="2400" dirty="0" smtClean="0"/>
-              <a:t>Monitoring </a:t>
-            </a:r>
-            <a:r>
-              <a:rPr lang="en-US" sz="2400" dirty="0" smtClean="0"/>
-              <a:t>and Statistics Reports</a:t>
+              <a:t>Monitoring and Statistics Reports</a:t>
             </a:r>
           </a:p>
           <a:p>
@@ -16814,13 +16719,8 @@
             </a:r>
             <a:r>
               <a:rPr lang="en-US" sz="3200" dirty="0" smtClean="0"/>
-              <a:t> </a:t>
-            </a:r>
-            <a:r>
-              <a:rPr lang="en-US" sz="3200" dirty="0" smtClean="0"/>
-              <a:t>Overview</a:t>
-            </a:r>
-            <a:endParaRPr lang="en-US" sz="3200" dirty="0" smtClean="0"/>
+              <a:t> Overview</a:t>
+            </a:r>
           </a:p>
         </p:txBody>
       </p:sp>
@@ -17379,7 +17279,6 @@
               <a:rPr lang="en-US" dirty="0" smtClean="0"/>
               <a:t>THANK YOU!</a:t>
             </a:r>
-            <a:endParaRPr lang="en-US" dirty="0" smtClean="0"/>
           </a:p>
         </p:txBody>
       </p:sp>
@@ -17418,36 +17317,23 @@
               <a:rPr lang="en-US" sz="2400" dirty="0" smtClean="0"/>
               <a:t>Email:    javier@lozanotek.com</a:t>
             </a:r>
-            <a:endParaRPr lang="en-US" sz="2400" dirty="0" smtClean="0"/>
           </a:p>
           <a:p>
             <a:r>
               <a:rPr lang="en-US" sz="2400" dirty="0" smtClean="0"/>
-              <a:t>Blog:     http</a:t>
-            </a:r>
+              <a:t>Blog:     http://lozanotek.com/blog</a:t>
+            </a:r>
+          </a:p>
+          <a:p>
             <a:r>
               <a:rPr lang="en-US" sz="2400" dirty="0" smtClean="0"/>
-              <a:t>://lozanotek.com/blog</a:t>
+              <a:t>Twitter:  http://twitter.com/jglozano</a:t>
             </a:r>
           </a:p>
           <a:p>
             <a:r>
               <a:rPr lang="en-US" sz="2400" dirty="0" smtClean="0"/>
-              <a:t>Twitter:  http</a:t>
-            </a:r>
-            <a:r>
-              <a:rPr lang="en-US" sz="2400" dirty="0" smtClean="0"/>
-              <a:t>://twitter.com/jglozano</a:t>
-            </a:r>
-          </a:p>
-          <a:p>
-            <a:r>
-              <a:rPr lang="en-US" sz="2400" dirty="0" smtClean="0"/>
-              <a:t>Code:    http</a:t>
-            </a:r>
-            <a:r>
-              <a:rPr lang="en-US" sz="2400" dirty="0" smtClean="0"/>
-              <a:t>://github.com/jglozano/opensourcetools</a:t>
+              <a:t>Code:    http://github.com/jglozano/opensourcetools</a:t>
             </a:r>
           </a:p>
         </p:txBody>
@@ -17797,36 +17683,23 @@
               <a:rPr lang="en-US" sz="2400" dirty="0" smtClean="0"/>
               <a:t>Email:    javier@lozanotek.com</a:t>
             </a:r>
-            <a:endParaRPr lang="en-US" sz="2400" dirty="0" smtClean="0"/>
           </a:p>
           <a:p>
             <a:r>
               <a:rPr lang="en-US" sz="2400" dirty="0" smtClean="0"/>
-              <a:t>Blog:     http</a:t>
-            </a:r>
+              <a:t>Blog:     http://lozanotek.com/blog</a:t>
+            </a:r>
+          </a:p>
+          <a:p>
             <a:r>
               <a:rPr lang="en-US" sz="2400" dirty="0" smtClean="0"/>
-              <a:t>://lozanotek.com/blog</a:t>
+              <a:t>Twitter:  http://twitter.com/jglozano</a:t>
             </a:r>
           </a:p>
           <a:p>
             <a:r>
               <a:rPr lang="en-US" sz="2400" dirty="0" smtClean="0"/>
-              <a:t>Twitter:  http</a:t>
-            </a:r>
-            <a:r>
-              <a:rPr lang="en-US" sz="2400" dirty="0" smtClean="0"/>
-              <a:t>://twitter.com/jglozano</a:t>
-            </a:r>
-          </a:p>
-          <a:p>
-            <a:r>
-              <a:rPr lang="en-US" sz="2400" dirty="0" smtClean="0"/>
-              <a:t>Code:    http</a:t>
-            </a:r>
-            <a:r>
-              <a:rPr lang="en-US" sz="2400" dirty="0" smtClean="0"/>
-              <a:t>://github.com/jglozano/opensourcetools</a:t>
+              <a:t>Code:    http://github.com/jglozano/opensourcetools</a:t>
             </a:r>
           </a:p>
         </p:txBody>
@@ -17897,7 +17770,6 @@
               <a:rPr lang="en-US" dirty="0" smtClean="0"/>
               <a:t>JOKE TIME</a:t>
             </a:r>
-            <a:endParaRPr lang="en-US" dirty="0" smtClean="0"/>
           </a:p>
         </p:txBody>
       </p:sp>
@@ -17939,7 +17811,6 @@
               <a:rPr lang="en-US" sz="2400" b="1" dirty="0" smtClean="0"/>
               <a:t>How many developers does it take to change a light bulb?</a:t>
             </a:r>
-            <a:endParaRPr lang="en-US" sz="2400" b="1" dirty="0" smtClean="0"/>
           </a:p>
         </p:txBody>
       </p:sp>
@@ -18118,7 +17989,6 @@
               <a:rPr lang="en-US" sz="2400" dirty="0" smtClean="0"/>
               <a:t>We looked at the light fixture and decided there's no point trying to maintain it. </a:t>
             </a:r>
-            <a:endParaRPr lang="en-US" sz="2400" dirty="0" smtClean="0"/>
           </a:p>
           <a:p>
             <a:pPr marL="342900" lvl="0" indent="-342900" fontAlgn="auto">
@@ -18134,13 +18004,8 @@
             </a:pPr>
             <a:r>
               <a:rPr lang="en-US" sz="2400" dirty="0" smtClean="0"/>
-              <a:t>We're </a:t>
-            </a:r>
-            <a:r>
-              <a:rPr lang="en-US" sz="2400" dirty="0" smtClean="0"/>
-              <a:t>going to rewrite it from scratch. </a:t>
-            </a:r>
-            <a:endParaRPr lang="en-US" sz="2400" dirty="0" smtClean="0"/>
+              <a:t>We're going to rewrite it from scratch. </a:t>
+            </a:r>
           </a:p>
           <a:p>
             <a:pPr marL="342900" lvl="0" indent="-342900" fontAlgn="auto">
@@ -18156,11 +18021,7 @@
             </a:pPr>
             <a:r>
               <a:rPr lang="en-US" sz="2400" dirty="0" smtClean="0"/>
-              <a:t>Could </a:t>
-            </a:r>
-            <a:r>
-              <a:rPr lang="en-US" sz="2400" dirty="0" smtClean="0"/>
-              <a:t>you wait two months?</a:t>
+              <a:t>Could you wait two months?</a:t>
             </a:r>
             <a:endParaRPr kumimoji="0" lang="en-US" sz="2400" b="0" i="0" u="none" strike="noStrike" kern="1200" cap="none" spc="30" normalizeH="0" baseline="0" noProof="0" dirty="0" smtClean="0">
               <a:ln>

</xml_diff>